<commit_message>
Form dang ky - dang nhap bang Reactjs
</commit_message>
<xml_diff>
--- a/_nhandt/TMA_Template.pptx
+++ b/_nhandt/TMA_Template.pptx
@@ -5,17 +5,19 @@
     <p:sldMasterId id="2147483660" r:id="rId1"/>
   </p:sldMasterIdLst>
   <p:notesMasterIdLst>
-    <p:notesMasterId r:id="rId7"/>
+    <p:notesMasterId r:id="rId9"/>
   </p:notesMasterIdLst>
   <p:handoutMasterIdLst>
-    <p:handoutMasterId r:id="rId8"/>
+    <p:handoutMasterId r:id="rId10"/>
   </p:handoutMasterIdLst>
   <p:sldIdLst>
     <p:sldId id="256" r:id="rId2"/>
     <p:sldId id="257" r:id="rId3"/>
     <p:sldId id="310" r:id="rId4"/>
     <p:sldId id="311" r:id="rId5"/>
-    <p:sldId id="303" r:id="rId6"/>
+    <p:sldId id="312" r:id="rId6"/>
+    <p:sldId id="313" r:id="rId7"/>
+    <p:sldId id="303" r:id="rId8"/>
   </p:sldIdLst>
   <p:sldSz cx="12192000" cy="6858000"/>
   <p:notesSz cx="6858000" cy="9296400"/>
@@ -116,7 +118,7 @@
   </p:defaultTextStyle>
   <p:extLst>
     <p:ext uri="{EFAFB233-063F-42B5-8137-9DF3F51BA10A}">
-      <p15:sldGuideLst xmlns:p15="http://schemas.microsoft.com/office/powerpoint/2012/main"/>
+      <p15:sldGuideLst xmlns:p15="http://schemas.microsoft.com/office/powerpoint/2012/main" xmlns=""/>
     </p:ext>
   </p:extLst>
 </p:presentation>
@@ -204,7 +206,7 @@
           <a:p>
             <a:fld id="{2D4FFC92-FD38-4948-95AD-840D73462D49}" type="datetimeFigureOut">
               <a:rPr lang="en-US" smtClean="0"/>
-              <a:t>9/17/2018</a:t>
+              <a:t>4/23/2019</a:t>
             </a:fld>
             <a:endParaRPr lang="en-US"/>
           </a:p>
@@ -369,7 +371,7 @@
           <a:p>
             <a:fld id="{6D6E62BE-2EED-4DF1-AB91-E2E5709673D1}" type="datetimeFigureOut">
               <a:rPr lang="en-US" smtClean="0"/>
-              <a:t>9/17/2018</a:t>
+              <a:t>4/23/2019</a:t>
             </a:fld>
             <a:endParaRPr lang="en-US"/>
           </a:p>
@@ -5143,40 +5145,26 @@
           <a:p>
             <a:pPr lvl="0"/>
             <a:r>
-              <a:rPr lang="en-US" dirty="0"/>
-              <a:t>Where </a:t>
-            </a:r>
-            <a:r>
               <a:rPr lang="en-US" dirty="0" smtClean="0"/>
-              <a:t>We </a:t>
-            </a:r>
-            <a:r>
-              <a:rPr lang="en-US" dirty="0"/>
-              <a:t>A</a:t>
-            </a:r>
+              <a:t>Introduce</a:t>
+            </a:r>
+            <a:endParaRPr lang="en-US" dirty="0"/>
+          </a:p>
+          <a:p>
+            <a:pPr lvl="0"/>
             <a:r>
               <a:rPr lang="en-US" dirty="0" smtClean="0"/>
-              <a:t>re </a:t>
-            </a:r>
-            <a:endParaRPr lang="en-US" dirty="0"/>
+              <a:t>Product</a:t>
+            </a:r>
+            <a:endParaRPr lang="en-US" dirty="0" smtClean="0"/>
           </a:p>
           <a:p>
             <a:pPr lvl="0"/>
             <a:r>
-              <a:rPr lang="en-US" smtClean="0"/>
-              <a:t>Organization </a:t>
-            </a:r>
-            <a:r>
               <a:rPr lang="en-US" dirty="0" smtClean="0"/>
-              <a:t>Chart</a:t>
-            </a:r>
-          </a:p>
-          <a:p>
-            <a:pPr lvl="0"/>
-            <a:r>
-              <a:rPr lang="en-US" dirty="0" smtClean="0"/>
-              <a:t>H2 Objectives</a:t>
-            </a:r>
+              <a:t>Future Plans</a:t>
+            </a:r>
+            <a:endParaRPr lang="en-US" dirty="0" smtClean="0"/>
           </a:p>
           <a:p>
             <a:pPr marL="0" lvl="0" indent="0">
@@ -5229,38 +5217,10 @@
       </p:grpSpPr>
       <p:sp>
         <p:nvSpPr>
-          <p:cNvPr id="2" name="Title 1">
-            <a:extLst>
-              <a:ext uri="{FF2B5EF4-FFF2-40B4-BE49-F238E27FC236}">
-                <a16:creationId xmlns:a16="http://schemas.microsoft.com/office/drawing/2014/main" id="{401C3590-D317-EB48-8027-6831D5823FD9}"/>
-              </a:ext>
-            </a:extLst>
-          </p:cNvPr>
-          <p:cNvSpPr>
-            <a:spLocks noGrp="1"/>
-          </p:cNvSpPr>
-          <p:nvPr>
-            <p:ph type="title"/>
-          </p:nvPr>
-        </p:nvSpPr>
-        <p:spPr/>
-        <p:txBody>
-          <a:bodyPr/>
-          <a:lstStyle/>
-          <a:p>
-            <a:r>
-              <a:rPr lang="en-US" dirty="0"/>
-              <a:t>WHERE WE ARE</a:t>
-            </a:r>
-          </a:p>
-        </p:txBody>
-      </p:sp>
-      <p:sp>
-        <p:nvSpPr>
           <p:cNvPr id="3" name="Content Placeholder 2">
             <a:extLst>
               <a:ext uri="{FF2B5EF4-FFF2-40B4-BE49-F238E27FC236}">
-                <a16:creationId xmlns:a16="http://schemas.microsoft.com/office/drawing/2014/main" id="{842C0B6F-64E8-4E4E-9BDA-3CD79C05D932}"/>
+                <a16:creationId xmlns:a16="http://schemas.microsoft.com/office/drawing/2014/main" xmlns="" id="{842C0B6F-64E8-4E4E-9BDA-3CD79C05D932}"/>
               </a:ext>
             </a:extLst>
           </p:cNvPr>
@@ -5276,6 +5236,79 @@
           <a:bodyPr/>
           <a:lstStyle/>
           <a:p>
+            <a:r>
+              <a:rPr lang="en-US" dirty="0" smtClean="0"/>
+              <a:t>Learn about HTML, CSS.</a:t>
+            </a:r>
+          </a:p>
+          <a:p>
+            <a:r>
+              <a:rPr lang="en-US" dirty="0" smtClean="0"/>
+              <a:t>Learn </a:t>
+            </a:r>
+            <a:r>
+              <a:rPr lang="en-US" dirty="0" err="1" smtClean="0"/>
+              <a:t>Javascript</a:t>
+            </a:r>
+            <a:r>
+              <a:rPr lang="en-US" dirty="0" smtClean="0"/>
+              <a:t>.</a:t>
+            </a:r>
+          </a:p>
+          <a:p>
+            <a:r>
+              <a:rPr lang="en-US" dirty="0" smtClean="0"/>
+              <a:t>Learn basic </a:t>
+            </a:r>
+            <a:r>
+              <a:rPr lang="en-US" dirty="0" err="1" smtClean="0"/>
+              <a:t>git</a:t>
+            </a:r>
+            <a:r>
+              <a:rPr lang="en-US" dirty="0" smtClean="0"/>
+              <a:t> usage.</a:t>
+            </a:r>
+          </a:p>
+          <a:p>
+            <a:r>
+              <a:rPr lang="en-US" dirty="0" smtClean="0"/>
+              <a:t>Study </a:t>
+            </a:r>
+            <a:r>
+              <a:rPr lang="en-US" dirty="0" err="1"/>
+              <a:t>R</a:t>
+            </a:r>
+            <a:r>
+              <a:rPr lang="en-US" dirty="0" err="1" smtClean="0"/>
+              <a:t>eactjs</a:t>
+            </a:r>
+            <a:r>
+              <a:rPr lang="en-US" dirty="0" smtClean="0"/>
+              <a:t>.</a:t>
+            </a:r>
+            <a:endParaRPr lang="en-US" dirty="0"/>
+          </a:p>
+        </p:txBody>
+      </p:sp>
+      <p:sp>
+        <p:nvSpPr>
+          <p:cNvPr id="4" name="Title 3"/>
+          <p:cNvSpPr>
+            <a:spLocks noGrp="1"/>
+          </p:cNvSpPr>
+          <p:nvPr>
+            <p:ph type="title"/>
+          </p:nvPr>
+        </p:nvSpPr>
+        <p:spPr/>
+        <p:txBody>
+          <a:bodyPr/>
+          <a:lstStyle/>
+          <a:p>
+            <a:r>
+              <a:rPr lang="en-US" dirty="0" smtClean="0"/>
+              <a:t>INTRODUCE</a:t>
+            </a:r>
             <a:endParaRPr lang="en-US" dirty="0"/>
           </a:p>
         </p:txBody>
@@ -5322,7 +5355,7 @@
           <p:cNvPr id="2" name="Title 1">
             <a:extLst>
               <a:ext uri="{FF2B5EF4-FFF2-40B4-BE49-F238E27FC236}">
-                <a16:creationId xmlns:a16="http://schemas.microsoft.com/office/drawing/2014/main" id="{FA1EAA4D-6B1F-C14B-A2CA-679650492391}"/>
+                <a16:creationId xmlns:a16="http://schemas.microsoft.com/office/drawing/2014/main" xmlns="" id="{FA1EAA4D-6B1F-C14B-A2CA-679650492391}"/>
               </a:ext>
             </a:extLst>
           </p:cNvPr>
@@ -5339,21 +5372,16 @@
           <a:lstStyle/>
           <a:p>
             <a:r>
-              <a:rPr lang="en-US" dirty="0"/>
-              <a:t>H2-2018 MISSION</a:t>
-            </a:r>
+              <a:rPr lang="en-US" dirty="0" smtClean="0"/>
+              <a:t>PRODUCT</a:t>
+            </a:r>
+            <a:endParaRPr lang="en-US" dirty="0"/>
           </a:p>
         </p:txBody>
       </p:sp>
       <p:sp>
         <p:nvSpPr>
-          <p:cNvPr id="3" name="Content Placeholder 2">
-            <a:extLst>
-              <a:ext uri="{FF2B5EF4-FFF2-40B4-BE49-F238E27FC236}">
-                <a16:creationId xmlns:a16="http://schemas.microsoft.com/office/drawing/2014/main" id="{9CB104E4-3A6D-C94D-86C9-7349E42FBB3F}"/>
-              </a:ext>
-            </a:extLst>
-          </p:cNvPr>
+          <p:cNvPr id="6" name="Content Placeholder 5"/>
           <p:cNvSpPr>
             <a:spLocks noGrp="1"/>
           </p:cNvSpPr>
@@ -5366,10 +5394,52 @@
           <a:bodyPr/>
           <a:lstStyle/>
           <a:p>
-            <a:endParaRPr lang="en-US" sz="5400" dirty="0" smtClean="0"/>
+            <a:r>
+              <a:rPr lang="en-US" dirty="0" smtClean="0"/>
+              <a:t>The Form Register by HTML, CSS and </a:t>
+            </a:r>
+            <a:r>
+              <a:rPr lang="en-US" dirty="0" err="1" smtClean="0"/>
+              <a:t>Javascript</a:t>
+            </a:r>
+            <a:r>
+              <a:rPr lang="en-US" dirty="0" smtClean="0"/>
+              <a:t>.</a:t>
+            </a:r>
+            <a:endParaRPr lang="en-US" dirty="0"/>
           </a:p>
         </p:txBody>
       </p:sp>
+      <p:pic>
+        <p:nvPicPr>
+          <p:cNvPr id="8" name="Picture 7"/>
+          <p:cNvPicPr>
+            <a:picLocks noChangeAspect="1"/>
+          </p:cNvPicPr>
+          <p:nvPr/>
+        </p:nvPicPr>
+        <p:blipFill>
+          <a:blip r:embed="rId2">
+            <a:extLst>
+              <a:ext uri="{28A0092B-C50C-407E-A947-70E740481C1C}">
+                <a14:useLocalDpi xmlns:a14="http://schemas.microsoft.com/office/drawing/2010/main" val="0"/>
+              </a:ext>
+            </a:extLst>
+          </a:blip>
+          <a:stretch>
+            <a:fillRect/>
+          </a:stretch>
+        </p:blipFill>
+        <p:spPr>
+          <a:xfrm>
+            <a:off x="2341419" y="1738968"/>
+            <a:ext cx="8035636" cy="4443733"/>
+          </a:xfrm>
+          <a:prstGeom prst="rect">
+            <a:avLst/>
+          </a:prstGeom>
+        </p:spPr>
+      </p:pic>
     </p:spTree>
     <p:extLst>
       <p:ext uri="{BB962C8B-B14F-4D97-AF65-F5344CB8AC3E}">
@@ -5391,6 +5461,280 @@
 </file>
 
 <file path=ppt/slides/slide5.xml><?xml version="1.0" encoding="utf-8"?>
+<p:sld xmlns:a="http://schemas.openxmlformats.org/drawingml/2006/main" xmlns:r="http://schemas.openxmlformats.org/officeDocument/2006/relationships" xmlns:p="http://schemas.openxmlformats.org/presentationml/2006/main">
+  <p:cSld>
+    <p:spTree>
+      <p:nvGrpSpPr>
+        <p:cNvPr id="1" name=""/>
+        <p:cNvGrpSpPr/>
+        <p:nvPr/>
+      </p:nvGrpSpPr>
+      <p:grpSpPr>
+        <a:xfrm>
+          <a:off x="0" y="0"/>
+          <a:ext cx="0" cy="0"/>
+          <a:chOff x="0" y="0"/>
+          <a:chExt cx="0" cy="0"/>
+        </a:xfrm>
+      </p:grpSpPr>
+      <p:sp>
+        <p:nvSpPr>
+          <p:cNvPr id="2" name="Title 1"/>
+          <p:cNvSpPr>
+            <a:spLocks noGrp="1"/>
+          </p:cNvSpPr>
+          <p:nvPr>
+            <p:ph type="title"/>
+          </p:nvPr>
+        </p:nvSpPr>
+        <p:spPr/>
+        <p:txBody>
+          <a:bodyPr/>
+          <a:lstStyle/>
+          <a:p>
+            <a:r>
+              <a:rPr lang="en-US" dirty="0" smtClean="0"/>
+              <a:t>PRODUTION</a:t>
+            </a:r>
+            <a:endParaRPr lang="en-US" dirty="0"/>
+          </a:p>
+        </p:txBody>
+      </p:sp>
+      <p:sp>
+        <p:nvSpPr>
+          <p:cNvPr id="3" name="Content Placeholder 2"/>
+          <p:cNvSpPr>
+            <a:spLocks noGrp="1"/>
+          </p:cNvSpPr>
+          <p:nvPr>
+            <p:ph idx="1"/>
+          </p:nvPr>
+        </p:nvSpPr>
+        <p:spPr/>
+        <p:txBody>
+          <a:bodyPr/>
+          <a:lstStyle/>
+          <a:p>
+            <a:r>
+              <a:rPr lang="en-US" dirty="0" smtClean="0"/>
+              <a:t>The Calculator by HTML, CSS and </a:t>
+            </a:r>
+            <a:r>
+              <a:rPr lang="en-US" dirty="0" err="1" smtClean="0"/>
+              <a:t>Javascript</a:t>
+            </a:r>
+            <a:r>
+              <a:rPr lang="en-US" dirty="0"/>
+              <a:t>.</a:t>
+            </a:r>
+          </a:p>
+        </p:txBody>
+      </p:sp>
+      <p:pic>
+        <p:nvPicPr>
+          <p:cNvPr id="4" name="Picture 3"/>
+          <p:cNvPicPr>
+            <a:picLocks noChangeAspect="1"/>
+          </p:cNvPicPr>
+          <p:nvPr/>
+        </p:nvPicPr>
+        <p:blipFill>
+          <a:blip r:embed="rId2">
+            <a:extLst>
+              <a:ext uri="{28A0092B-C50C-407E-A947-70E740481C1C}">
+                <a14:useLocalDpi xmlns:a14="http://schemas.microsoft.com/office/drawing/2010/main" val="0"/>
+              </a:ext>
+            </a:extLst>
+          </a:blip>
+          <a:stretch>
+            <a:fillRect/>
+          </a:stretch>
+        </p:blipFill>
+        <p:spPr>
+          <a:xfrm>
+            <a:off x="2230582" y="1814945"/>
+            <a:ext cx="7897091" cy="4433455"/>
+          </a:xfrm>
+          <a:prstGeom prst="rect">
+            <a:avLst/>
+          </a:prstGeom>
+        </p:spPr>
+      </p:pic>
+    </p:spTree>
+    <p:extLst>
+      <p:ext uri="{BB962C8B-B14F-4D97-AF65-F5344CB8AC3E}">
+        <p14:creationId xmlns:p14="http://schemas.microsoft.com/office/powerpoint/2010/main" val="1751593688"/>
+      </p:ext>
+    </p:extLst>
+  </p:cSld>
+  <p:clrMapOvr>
+    <a:masterClrMapping/>
+  </p:clrMapOvr>
+  <p:timing>
+    <p:tnLst>
+      <p:par>
+        <p:cTn id="1" dur="indefinite" restart="never" nodeType="tmRoot"/>
+      </p:par>
+    </p:tnLst>
+  </p:timing>
+</p:sld>
+</file>
+
+<file path=ppt/slides/slide6.xml><?xml version="1.0" encoding="utf-8"?>
+<p:sld xmlns:a="http://schemas.openxmlformats.org/drawingml/2006/main" xmlns:r="http://schemas.openxmlformats.org/officeDocument/2006/relationships" xmlns:p="http://schemas.openxmlformats.org/presentationml/2006/main">
+  <p:cSld>
+    <p:spTree>
+      <p:nvGrpSpPr>
+        <p:cNvPr id="1" name=""/>
+        <p:cNvGrpSpPr/>
+        <p:nvPr/>
+      </p:nvGrpSpPr>
+      <p:grpSpPr>
+        <a:xfrm>
+          <a:off x="0" y="0"/>
+          <a:ext cx="0" cy="0"/>
+          <a:chOff x="0" y="0"/>
+          <a:chExt cx="0" cy="0"/>
+        </a:xfrm>
+      </p:grpSpPr>
+      <p:sp>
+        <p:nvSpPr>
+          <p:cNvPr id="2" name="Title 1"/>
+          <p:cNvSpPr>
+            <a:spLocks noGrp="1"/>
+          </p:cNvSpPr>
+          <p:nvPr>
+            <p:ph type="title"/>
+          </p:nvPr>
+        </p:nvSpPr>
+        <p:spPr/>
+        <p:txBody>
+          <a:bodyPr/>
+          <a:lstStyle/>
+          <a:p>
+            <a:r>
+              <a:rPr lang="en-US" dirty="0" smtClean="0"/>
+              <a:t>FUTURE PLANS</a:t>
+            </a:r>
+            <a:endParaRPr lang="en-US" dirty="0"/>
+          </a:p>
+        </p:txBody>
+      </p:sp>
+      <p:sp>
+        <p:nvSpPr>
+          <p:cNvPr id="3" name="Content Placeholder 2"/>
+          <p:cNvSpPr>
+            <a:spLocks noGrp="1"/>
+          </p:cNvSpPr>
+          <p:nvPr>
+            <p:ph idx="1"/>
+          </p:nvPr>
+        </p:nvSpPr>
+        <p:spPr/>
+        <p:txBody>
+          <a:bodyPr/>
+          <a:lstStyle/>
+          <a:p>
+            <a:r>
+              <a:rPr lang="en-US" dirty="0" smtClean="0"/>
+              <a:t>In next month:</a:t>
+            </a:r>
+          </a:p>
+          <a:p>
+            <a:pPr marL="457200" indent="-457200">
+              <a:buFont typeface="+mj-lt"/>
+              <a:buAutoNum type="arabicPeriod"/>
+            </a:pPr>
+            <a:r>
+              <a:rPr lang="en-US" dirty="0" smtClean="0"/>
+              <a:t>Learn more about </a:t>
+            </a:r>
+            <a:r>
+              <a:rPr lang="en-US" dirty="0" err="1" smtClean="0"/>
+              <a:t>Javascript</a:t>
+            </a:r>
+            <a:r>
+              <a:rPr lang="en-US" dirty="0" smtClean="0"/>
+              <a:t>.</a:t>
+            </a:r>
+          </a:p>
+          <a:p>
+            <a:pPr marL="457200" indent="-457200">
+              <a:buFont typeface="+mj-lt"/>
+              <a:buAutoNum type="arabicPeriod"/>
+            </a:pPr>
+            <a:r>
+              <a:rPr lang="en-US" dirty="0"/>
+              <a:t>Learn more about </a:t>
+            </a:r>
+            <a:r>
+              <a:rPr lang="en-US" dirty="0" err="1" smtClean="0"/>
+              <a:t>Reactjs</a:t>
+            </a:r>
+            <a:r>
+              <a:rPr lang="en-US" dirty="0"/>
+              <a:t> </a:t>
+            </a:r>
+            <a:r>
+              <a:rPr lang="en-US" dirty="0" smtClean="0"/>
+              <a:t>:</a:t>
+            </a:r>
+          </a:p>
+          <a:p>
+            <a:pPr marL="628650" lvl="1" indent="-342900"/>
+            <a:r>
+              <a:rPr lang="en-US" dirty="0" smtClean="0"/>
+              <a:t>Study Components and Props.</a:t>
+            </a:r>
+          </a:p>
+          <a:p>
+            <a:pPr marL="628650" lvl="1" indent="-342900"/>
+            <a:r>
+              <a:rPr lang="en-US" dirty="0" smtClean="0"/>
+              <a:t>Handling event.</a:t>
+            </a:r>
+          </a:p>
+          <a:p>
+            <a:pPr marL="628650" lvl="1" indent="-342900"/>
+            <a:r>
+              <a:rPr lang="en-US" dirty="0" smtClean="0"/>
+              <a:t>And more ….</a:t>
+            </a:r>
+          </a:p>
+          <a:p>
+            <a:pPr marL="742950" lvl="1" indent="-457200"/>
+            <a:endParaRPr lang="en-US" dirty="0" smtClean="0"/>
+          </a:p>
+          <a:p>
+            <a:pPr marL="457200" indent="-457200">
+              <a:buFont typeface="+mj-lt"/>
+              <a:buAutoNum type="arabicPeriod"/>
+            </a:pPr>
+            <a:endParaRPr lang="en-US" dirty="0"/>
+          </a:p>
+        </p:txBody>
+      </p:sp>
+    </p:spTree>
+    <p:extLst>
+      <p:ext uri="{BB962C8B-B14F-4D97-AF65-F5344CB8AC3E}">
+        <p14:creationId xmlns:p14="http://schemas.microsoft.com/office/powerpoint/2010/main" val="3025265773"/>
+      </p:ext>
+    </p:extLst>
+  </p:cSld>
+  <p:clrMapOvr>
+    <a:masterClrMapping/>
+  </p:clrMapOvr>
+  <p:timing>
+    <p:tnLst>
+      <p:par>
+        <p:cTn id="1" dur="indefinite" restart="never" nodeType="tmRoot"/>
+      </p:par>
+    </p:tnLst>
+  </p:timing>
+</p:sld>
+</file>
+
+<file path=ppt/slides/slide7.xml><?xml version="1.0" encoding="utf-8"?>
 <p:sld xmlns:a="http://schemas.openxmlformats.org/drawingml/2006/main" xmlns:r="http://schemas.openxmlformats.org/officeDocument/2006/relationships" xmlns:p="http://schemas.openxmlformats.org/presentationml/2006/main">
   <p:cSld>
     <p:spTree>
@@ -5470,7 +5814,7 @@
     </a:clrScheme>
     <a:fontScheme name="Office Theme">
       <a:majorFont>
-        <a:latin typeface="Calibri Light" panose="020F0302020204030204"/>
+        <a:latin typeface="Calibri Light"/>
         <a:ea typeface=""/>
         <a:cs typeface=""/>
         <a:font script="Jpan" typeface="ＭＳ Ｐゴシック"/>
@@ -5505,7 +5849,7 @@
         <a:font script="Geor" typeface="Sylfaen"/>
       </a:majorFont>
       <a:minorFont>
-        <a:latin typeface="Calibri" panose="020F0502020204030204"/>
+        <a:latin typeface="Calibri"/>
         <a:ea typeface=""/>
         <a:cs typeface=""/>
         <a:font script="Jpan" typeface="ＭＳ Ｐゴシック"/>
@@ -5682,7 +6026,7 @@
   <a:extraClrSchemeLst/>
   <a:extLst>
     <a:ext uri="{05A4C25C-085E-4340-85A3-A5531E510DB2}">
-      <thm15:themeFamily xmlns:thm15="http://schemas.microsoft.com/office/thememl/2012/main" name="TMA_3" id="{EBB26D4A-7777-4508-BACA-87E50F0F39A5}" vid="{B1F8172A-6BE3-420C-8071-50049BF57321}"/>
+      <thm15:themeFamily xmlns:thm15="http://schemas.microsoft.com/office/thememl/2012/main" xmlns="" name="TMA_3" id="{EBB26D4A-7777-4508-BACA-87E50F0F39A5}" vid="{B1F8172A-6BE3-420C-8071-50049BF57321}"/>
     </a:ext>
   </a:extLst>
 </a:theme>
@@ -5731,7 +6075,7 @@
     </a:clrScheme>
     <a:fontScheme name="Office">
       <a:majorFont>
-        <a:latin typeface="Calibri Light" panose="020F0302020204030204"/>
+        <a:latin typeface="Calibri Light"/>
         <a:ea typeface=""/>
         <a:cs typeface=""/>
         <a:font script="Jpan" typeface="ＭＳ Ｐゴシック"/>
@@ -5766,7 +6110,7 @@
         <a:font script="Geor" typeface="Sylfaen"/>
       </a:majorFont>
       <a:minorFont>
-        <a:latin typeface="Calibri" panose="020F0502020204030204"/>
+        <a:latin typeface="Calibri"/>
         <a:ea typeface=""/>
         <a:cs typeface=""/>
         <a:font script="Jpan" typeface="ＭＳ Ｐゴシック"/>
@@ -5943,7 +6287,7 @@
   <a:extraClrSchemeLst/>
   <a:extLst>
     <a:ext uri="{05A4C25C-085E-4340-85A3-A5531E510DB2}">
-      <thm15:themeFamily xmlns:thm15="http://schemas.microsoft.com/office/thememl/2012/main" name="Office Theme" id="{62F939B6-93AF-4DB8-9C6B-D6C7DFDC589F}" vid="{4A3C46E8-61CC-4603-A589-7422A47A8E4A}"/>
+      <thm15:themeFamily xmlns:thm15="http://schemas.microsoft.com/office/thememl/2012/main" xmlns="" name="Office Theme" id="{62F939B6-93AF-4DB8-9C6B-D6C7DFDC589F}" vid="{4A3C46E8-61CC-4603-A589-7422A47A8E4A}"/>
     </a:ext>
   </a:extLst>
 </a:theme>
@@ -5992,7 +6336,7 @@
     </a:clrScheme>
     <a:fontScheme name="Office">
       <a:majorFont>
-        <a:latin typeface="Calibri Light" panose="020F0302020204030204"/>
+        <a:latin typeface="Calibri Light"/>
         <a:ea typeface=""/>
         <a:cs typeface=""/>
         <a:font script="Jpan" typeface="ＭＳ Ｐゴシック"/>
@@ -6027,7 +6371,7 @@
         <a:font script="Geor" typeface="Sylfaen"/>
       </a:majorFont>
       <a:minorFont>
-        <a:latin typeface="Calibri" panose="020F0502020204030204"/>
+        <a:latin typeface="Calibri"/>
         <a:ea typeface=""/>
         <a:cs typeface=""/>
         <a:font script="Jpan" typeface="ＭＳ Ｐゴシック"/>
@@ -6204,7 +6548,7 @@
   <a:extraClrSchemeLst/>
   <a:extLst>
     <a:ext uri="{05A4C25C-085E-4340-85A3-A5531E510DB2}">
-      <thm15:themeFamily xmlns:thm15="http://schemas.microsoft.com/office/thememl/2012/main" name="Office Theme" id="{62F939B6-93AF-4DB8-9C6B-D6C7DFDC589F}" vid="{4A3C46E8-61CC-4603-A589-7422A47A8E4A}"/>
+      <thm15:themeFamily xmlns:thm15="http://schemas.microsoft.com/office/thememl/2012/main" xmlns="" name="Office Theme" id="{62F939B6-93AF-4DB8-9C6B-D6C7DFDC589F}" vid="{4A3C46E8-61CC-4603-A589-7422A47A8E4A}"/>
     </a:ext>
   </a:extLst>
 </a:theme>

</xml_diff>